<commit_message>
Added slides for Cypher
</commit_message>
<xml_diff>
--- a/vivo.pptx
+++ b/vivo.pptx
@@ -5,7 +5,7 @@
     <p:sldMasterId id="2147483648" r:id="rId5"/>
   </p:sldMasterIdLst>
   <p:notesMasterIdLst>
-    <p:notesMasterId r:id="rId15"/>
+    <p:notesMasterId r:id="rId19"/>
   </p:notesMasterIdLst>
   <p:sldIdLst>
     <p:sldId id="256" r:id="rId6"/>
@@ -16,7 +16,11 @@
     <p:sldId id="286" r:id="rId11"/>
     <p:sldId id="278" r:id="rId12"/>
     <p:sldId id="279" r:id="rId13"/>
-    <p:sldId id="280" r:id="rId14"/>
+    <p:sldId id="320" r:id="rId14"/>
+    <p:sldId id="321" r:id="rId15"/>
+    <p:sldId id="322" r:id="rId16"/>
+    <p:sldId id="323" r:id="rId17"/>
+    <p:sldId id="324" r:id="rId18"/>
   </p:sldIdLst>
   <p:sldSz cx="9144000" cy="6858000" type="screen4x3"/>
   <p:notesSz cx="6858000" cy="9144000"/>
@@ -200,7 +204,7 @@
           <a:p>
             <a:fld id="{FF9B3963-213C-B149-8F57-6F5C421A59A0}" type="datetimeFigureOut">
               <a:rPr lang="en-US" smtClean="0"/>
-              <a:t>7/16/2015</a:t>
+              <a:t>7/27/15</a:t>
             </a:fld>
             <a:endParaRPr lang="en-US"/>
           </a:p>
@@ -921,7 +925,7 @@
           <a:p>
             <a:fld id="{274F94DF-47A7-AE45-8332-B46829B523A4}" type="datetimeFigureOut">
               <a:rPr lang="en-US" smtClean="0"/>
-              <a:t>7/16/2015</a:t>
+              <a:t>7/27/15</a:t>
             </a:fld>
             <a:endParaRPr lang="en-US"/>
           </a:p>
@@ -1086,7 +1090,7 @@
           <a:p>
             <a:fld id="{274F94DF-47A7-AE45-8332-B46829B523A4}" type="datetimeFigureOut">
               <a:rPr lang="en-US" smtClean="0"/>
-              <a:t>7/16/2015</a:t>
+              <a:t>7/27/15</a:t>
             </a:fld>
             <a:endParaRPr lang="en-US"/>
           </a:p>
@@ -1261,7 +1265,7 @@
           <a:p>
             <a:fld id="{274F94DF-47A7-AE45-8332-B46829B523A4}" type="datetimeFigureOut">
               <a:rPr lang="en-US" smtClean="0"/>
-              <a:t>7/16/2015</a:t>
+              <a:t>7/27/15</a:t>
             </a:fld>
             <a:endParaRPr lang="en-US"/>
           </a:p>
@@ -1426,7 +1430,7 @@
           <a:p>
             <a:fld id="{274F94DF-47A7-AE45-8332-B46829B523A4}" type="datetimeFigureOut">
               <a:rPr lang="en-US" smtClean="0"/>
-              <a:t>7/16/2015</a:t>
+              <a:t>7/27/15</a:t>
             </a:fld>
             <a:endParaRPr lang="en-US"/>
           </a:p>
@@ -1667,7 +1671,7 @@
           <a:p>
             <a:fld id="{274F94DF-47A7-AE45-8332-B46829B523A4}" type="datetimeFigureOut">
               <a:rPr lang="en-US" smtClean="0"/>
-              <a:t>7/16/2015</a:t>
+              <a:t>7/27/15</a:t>
             </a:fld>
             <a:endParaRPr lang="en-US"/>
           </a:p>
@@ -1950,7 +1954,7 @@
           <a:p>
             <a:fld id="{274F94DF-47A7-AE45-8332-B46829B523A4}" type="datetimeFigureOut">
               <a:rPr lang="en-US" smtClean="0"/>
-              <a:t>7/16/2015</a:t>
+              <a:t>7/27/15</a:t>
             </a:fld>
             <a:endParaRPr lang="en-US"/>
           </a:p>
@@ -2367,7 +2371,7 @@
           <a:p>
             <a:fld id="{274F94DF-47A7-AE45-8332-B46829B523A4}" type="datetimeFigureOut">
               <a:rPr lang="en-US" smtClean="0"/>
-              <a:t>7/16/2015</a:t>
+              <a:t>7/27/15</a:t>
             </a:fld>
             <a:endParaRPr lang="en-US"/>
           </a:p>
@@ -2480,7 +2484,7 @@
           <a:p>
             <a:fld id="{274F94DF-47A7-AE45-8332-B46829B523A4}" type="datetimeFigureOut">
               <a:rPr lang="en-US" smtClean="0"/>
-              <a:t>7/16/2015</a:t>
+              <a:t>7/27/15</a:t>
             </a:fld>
             <a:endParaRPr lang="en-US"/>
           </a:p>
@@ -2570,7 +2574,7 @@
           <a:p>
             <a:fld id="{274F94DF-47A7-AE45-8332-B46829B523A4}" type="datetimeFigureOut">
               <a:rPr lang="en-US" smtClean="0"/>
-              <a:t>7/16/2015</a:t>
+              <a:t>7/27/15</a:t>
             </a:fld>
             <a:endParaRPr lang="en-US"/>
           </a:p>
@@ -2842,7 +2846,7 @@
           <a:p>
             <a:fld id="{274F94DF-47A7-AE45-8332-B46829B523A4}" type="datetimeFigureOut">
               <a:rPr lang="en-US" smtClean="0"/>
-              <a:t>7/16/2015</a:t>
+              <a:t>7/27/15</a:t>
             </a:fld>
             <a:endParaRPr lang="en-US"/>
           </a:p>
@@ -3090,7 +3094,7 @@
           <a:p>
             <a:fld id="{274F94DF-47A7-AE45-8332-B46829B523A4}" type="datetimeFigureOut">
               <a:rPr lang="en-US" smtClean="0"/>
-              <a:t>7/16/2015</a:t>
+              <a:t>7/27/15</a:t>
             </a:fld>
             <a:endParaRPr lang="en-US"/>
           </a:p>
@@ -3305,7 +3309,7 @@
           <a:p>
             <a:fld id="{274F94DF-47A7-AE45-8332-B46829B523A4}" type="datetimeFigureOut">
               <a:rPr lang="en-US" smtClean="0"/>
-              <a:t>7/16/2015</a:t>
+              <a:t>7/27/15</a:t>
             </a:fld>
             <a:endParaRPr lang="en-US"/>
           </a:p>
@@ -3694,11 +3698,7 @@
           <a:p>
             <a:r>
               <a:rPr lang="en-US" dirty="0" smtClean="0"/>
-              <a:t>Graphs without </a:t>
-            </a:r>
-            <a:r>
-              <a:rPr lang="en-US" dirty="0" smtClean="0"/>
-              <a:t>Ontologies</a:t>
+              <a:t>Graphs without Ontologies</a:t>
             </a:r>
             <a:endParaRPr lang="en-US" sz="3600" dirty="0"/>
           </a:p>
@@ -3825,10 +3825,544 @@
   <p:timing>
     <p:tnLst>
       <p:par>
-        <p:cTn id="1" dur="indefinite" restart="never" nodeType="tmRoot"/>
+        <p:cTn xmlns:p14="http://schemas.microsoft.com/office/powerpoint/2010/main" id="1" dur="indefinite" restart="never" nodeType="tmRoot"/>
       </p:par>
     </p:tnLst>
   </p:timing>
+</p:sld>
+</file>
+
+<file path=ppt/slides/slide10.xml><?xml version="1.0" encoding="utf-8"?>
+<p:sld xmlns:a="http://schemas.openxmlformats.org/drawingml/2006/main" xmlns:r="http://schemas.openxmlformats.org/officeDocument/2006/relationships" xmlns:p="http://schemas.openxmlformats.org/presentationml/2006/main">
+  <p:cSld>
+    <p:spTree>
+      <p:nvGrpSpPr>
+        <p:cNvPr id="1" name=""/>
+        <p:cNvGrpSpPr/>
+        <p:nvPr/>
+      </p:nvGrpSpPr>
+      <p:grpSpPr>
+        <a:xfrm>
+          <a:off x="0" y="0"/>
+          <a:ext cx="0" cy="0"/>
+          <a:chOff x="0" y="0"/>
+          <a:chExt cx="0" cy="0"/>
+        </a:xfrm>
+      </p:grpSpPr>
+      <p:sp>
+        <p:nvSpPr>
+          <p:cNvPr id="2" name="Title 1"/>
+          <p:cNvSpPr>
+            <a:spLocks noGrp="1"/>
+          </p:cNvSpPr>
+          <p:nvPr>
+            <p:ph type="title"/>
+          </p:nvPr>
+        </p:nvSpPr>
+        <p:spPr/>
+        <p:txBody>
+          <a:bodyPr/>
+          <a:lstStyle/>
+          <a:p>
+            <a:r>
+              <a:rPr lang="en-US" dirty="0" smtClean="0"/>
+              <a:t>Top Journals in Philosophy</a:t>
+            </a:r>
+            <a:endParaRPr lang="en-US" dirty="0"/>
+          </a:p>
+        </p:txBody>
+      </p:sp>
+      <p:pic>
+        <p:nvPicPr>
+          <p:cNvPr id="4" name="Picture 3" descr="Screen Shot 2015-07-27 at 6.56.03 PM.png"/>
+          <p:cNvPicPr>
+            <a:picLocks noChangeAspect="1"/>
+          </p:cNvPicPr>
+          <p:nvPr/>
+        </p:nvPicPr>
+        <p:blipFill>
+          <a:blip r:embed="rId2">
+            <a:extLst>
+              <a:ext uri="{28A0092B-C50C-407E-A947-70E740481C1C}">
+                <a14:useLocalDpi xmlns:a14="http://schemas.microsoft.com/office/drawing/2010/main" val="0"/>
+              </a:ext>
+            </a:extLst>
+          </a:blip>
+          <a:stretch>
+            <a:fillRect/>
+          </a:stretch>
+        </p:blipFill>
+        <p:spPr>
+          <a:xfrm>
+            <a:off x="590373" y="3529893"/>
+            <a:ext cx="8096427" cy="2619182"/>
+          </a:xfrm>
+          <a:prstGeom prst="rect">
+            <a:avLst/>
+          </a:prstGeom>
+          <a:ln>
+            <a:noFill/>
+          </a:ln>
+          <a:effectLst>
+            <a:outerShdw blurRad="292100" dist="139700" dir="2700000" algn="tl" rotWithShape="0">
+              <a:srgbClr val="333333">
+                <a:alpha val="65000"/>
+              </a:srgbClr>
+            </a:outerShdw>
+          </a:effectLst>
+        </p:spPr>
+      </p:pic>
+      <p:pic>
+        <p:nvPicPr>
+          <p:cNvPr id="7" name="Picture 6" descr="Screen Shot 2015-07-27 at 6.58.38 PM.png"/>
+          <p:cNvPicPr>
+            <a:picLocks noChangeAspect="1"/>
+          </p:cNvPicPr>
+          <p:nvPr/>
+        </p:nvPicPr>
+        <p:blipFill>
+          <a:blip r:embed="rId3">
+            <a:clrChange>
+              <a:clrFrom>
+                <a:srgbClr val="FFFFFF"/>
+              </a:clrFrom>
+              <a:clrTo>
+                <a:srgbClr val="FFFFFF">
+                  <a:alpha val="0"/>
+                </a:srgbClr>
+              </a:clrTo>
+            </a:clrChange>
+            <a:extLst>
+              <a:ext uri="{28A0092B-C50C-407E-A947-70E740481C1C}">
+                <a14:useLocalDpi xmlns:a14="http://schemas.microsoft.com/office/drawing/2010/main" val="0"/>
+              </a:ext>
+            </a:extLst>
+          </a:blip>
+          <a:stretch>
+            <a:fillRect/>
+          </a:stretch>
+        </p:blipFill>
+        <p:spPr>
+          <a:xfrm>
+            <a:off x="290585" y="1627874"/>
+            <a:ext cx="7787938" cy="1656768"/>
+          </a:xfrm>
+          <a:prstGeom prst="rect">
+            <a:avLst/>
+          </a:prstGeom>
+        </p:spPr>
+      </p:pic>
+    </p:spTree>
+    <p:extLst>
+      <p:ext uri="{BB962C8B-B14F-4D97-AF65-F5344CB8AC3E}">
+        <p14:creationId xmlns:p14="http://schemas.microsoft.com/office/powerpoint/2010/main" val="2790496260"/>
+      </p:ext>
+    </p:extLst>
+  </p:cSld>
+  <p:clrMapOvr>
+    <a:masterClrMapping/>
+  </p:clrMapOvr>
+</p:sld>
+</file>
+
+<file path=ppt/slides/slide11.xml><?xml version="1.0" encoding="utf-8"?>
+<p:sld xmlns:a="http://schemas.openxmlformats.org/drawingml/2006/main" xmlns:r="http://schemas.openxmlformats.org/officeDocument/2006/relationships" xmlns:p="http://schemas.openxmlformats.org/presentationml/2006/main">
+  <p:cSld>
+    <p:spTree>
+      <p:nvGrpSpPr>
+        <p:cNvPr id="1" name=""/>
+        <p:cNvGrpSpPr/>
+        <p:nvPr/>
+      </p:nvGrpSpPr>
+      <p:grpSpPr>
+        <a:xfrm>
+          <a:off x="0" y="0"/>
+          <a:ext cx="0" cy="0"/>
+          <a:chOff x="0" y="0"/>
+          <a:chExt cx="0" cy="0"/>
+        </a:xfrm>
+      </p:grpSpPr>
+      <p:sp>
+        <p:nvSpPr>
+          <p:cNvPr id="2" name="Title 1"/>
+          <p:cNvSpPr>
+            <a:spLocks noGrp="1"/>
+          </p:cNvSpPr>
+          <p:nvPr>
+            <p:ph type="title"/>
+          </p:nvPr>
+        </p:nvSpPr>
+        <p:spPr/>
+        <p:txBody>
+          <a:bodyPr>
+            <a:normAutofit fontScale="90000"/>
+          </a:bodyPr>
+          <a:lstStyle/>
+          <a:p>
+            <a:r>
+              <a:rPr lang="en-US" dirty="0" smtClean="0"/>
+              <a:t>Show Papers with Most Co-Authors</a:t>
+            </a:r>
+            <a:endParaRPr lang="en-US" dirty="0"/>
+          </a:p>
+        </p:txBody>
+      </p:sp>
+      <p:pic>
+        <p:nvPicPr>
+          <p:cNvPr id="3" name="Picture 2" descr="Screen Shot 2015-07-27 at 7.04.07 PM.png"/>
+          <p:cNvPicPr>
+            <a:picLocks noChangeAspect="1"/>
+          </p:cNvPicPr>
+          <p:nvPr/>
+        </p:nvPicPr>
+        <p:blipFill>
+          <a:blip r:embed="rId2">
+            <a:extLst>
+              <a:ext uri="{28A0092B-C50C-407E-A947-70E740481C1C}">
+                <a14:useLocalDpi xmlns:a14="http://schemas.microsoft.com/office/drawing/2010/main" val="0"/>
+              </a:ext>
+            </a:extLst>
+          </a:blip>
+          <a:stretch>
+            <a:fillRect/>
+          </a:stretch>
+        </p:blipFill>
+        <p:spPr>
+          <a:xfrm>
+            <a:off x="2636787" y="3562164"/>
+            <a:ext cx="6050012" cy="3020498"/>
+          </a:xfrm>
+          <a:prstGeom prst="rect">
+            <a:avLst/>
+          </a:prstGeom>
+          <a:ln>
+            <a:noFill/>
+          </a:ln>
+          <a:effectLst>
+            <a:outerShdw blurRad="292100" dist="139700" dir="2700000" algn="tl" rotWithShape="0">
+              <a:srgbClr val="333333">
+                <a:alpha val="65000"/>
+              </a:srgbClr>
+            </a:outerShdw>
+          </a:effectLst>
+        </p:spPr>
+      </p:pic>
+      <p:pic>
+        <p:nvPicPr>
+          <p:cNvPr id="4" name="Picture 3" descr="Screen Shot 2015-07-27 at 7.04.31 PM.png"/>
+          <p:cNvPicPr>
+            <a:picLocks noChangeAspect="1"/>
+          </p:cNvPicPr>
+          <p:nvPr/>
+        </p:nvPicPr>
+        <p:blipFill>
+          <a:blip r:embed="rId3">
+            <a:clrChange>
+              <a:clrFrom>
+                <a:srgbClr val="FFFFFF"/>
+              </a:clrFrom>
+              <a:clrTo>
+                <a:srgbClr val="FFFFFF">
+                  <a:alpha val="0"/>
+                </a:srgbClr>
+              </a:clrTo>
+            </a:clrChange>
+            <a:extLst>
+              <a:ext uri="{28A0092B-C50C-407E-A947-70E740481C1C}">
+                <a14:useLocalDpi xmlns:a14="http://schemas.microsoft.com/office/drawing/2010/main" val="0"/>
+              </a:ext>
+            </a:extLst>
+          </a:blip>
+          <a:stretch>
+            <a:fillRect/>
+          </a:stretch>
+        </p:blipFill>
+        <p:spPr>
+          <a:xfrm>
+            <a:off x="457200" y="1761067"/>
+            <a:ext cx="5526692" cy="1670154"/>
+          </a:xfrm>
+          <a:prstGeom prst="rect">
+            <a:avLst/>
+          </a:prstGeom>
+        </p:spPr>
+      </p:pic>
+    </p:spTree>
+    <p:extLst>
+      <p:ext uri="{BB962C8B-B14F-4D97-AF65-F5344CB8AC3E}">
+        <p14:creationId xmlns:p14="http://schemas.microsoft.com/office/powerpoint/2010/main" val="2369358931"/>
+      </p:ext>
+    </p:extLst>
+  </p:cSld>
+  <p:clrMapOvr>
+    <a:masterClrMapping/>
+  </p:clrMapOvr>
+</p:sld>
+</file>
+
+<file path=ppt/slides/slide12.xml><?xml version="1.0" encoding="utf-8"?>
+<p:sld xmlns:a="http://schemas.openxmlformats.org/drawingml/2006/main" xmlns:r="http://schemas.openxmlformats.org/officeDocument/2006/relationships" xmlns:p="http://schemas.openxmlformats.org/presentationml/2006/main">
+  <p:cSld>
+    <p:spTree>
+      <p:nvGrpSpPr>
+        <p:cNvPr id="1" name=""/>
+        <p:cNvGrpSpPr/>
+        <p:nvPr/>
+      </p:nvGrpSpPr>
+      <p:grpSpPr>
+        <a:xfrm>
+          <a:off x="0" y="0"/>
+          <a:ext cx="0" cy="0"/>
+          <a:chOff x="0" y="0"/>
+          <a:chExt cx="0" cy="0"/>
+        </a:xfrm>
+      </p:grpSpPr>
+      <p:sp>
+        <p:nvSpPr>
+          <p:cNvPr id="2" name="Title 1"/>
+          <p:cNvSpPr>
+            <a:spLocks noGrp="1"/>
+          </p:cNvSpPr>
+          <p:nvPr>
+            <p:ph type="title"/>
+          </p:nvPr>
+        </p:nvSpPr>
+        <p:spPr/>
+        <p:txBody>
+          <a:bodyPr/>
+          <a:lstStyle/>
+          <a:p>
+            <a:r>
+              <a:rPr lang="en-US" dirty="0" smtClean="0"/>
+              <a:t>Recommendation Engine</a:t>
+            </a:r>
+            <a:endParaRPr lang="en-US" dirty="0"/>
+          </a:p>
+        </p:txBody>
+      </p:sp>
+      <p:pic>
+        <p:nvPicPr>
+          <p:cNvPr id="3" name="Picture 2" descr="Screen Shot 2015-07-27 at 7.14.29 PM.png"/>
+          <p:cNvPicPr>
+            <a:picLocks noChangeAspect="1"/>
+          </p:cNvPicPr>
+          <p:nvPr/>
+        </p:nvPicPr>
+        <p:blipFill>
+          <a:blip r:embed="rId2">
+            <a:clrChange>
+              <a:clrFrom>
+                <a:srgbClr val="FFFFFF"/>
+              </a:clrFrom>
+              <a:clrTo>
+                <a:srgbClr val="FFFFFF">
+                  <a:alpha val="0"/>
+                </a:srgbClr>
+              </a:clrTo>
+            </a:clrChange>
+            <a:extLst>
+              <a:ext uri="{28A0092B-C50C-407E-A947-70E740481C1C}">
+                <a14:useLocalDpi xmlns:a14="http://schemas.microsoft.com/office/drawing/2010/main" val="0"/>
+              </a:ext>
+            </a:extLst>
+          </a:blip>
+          <a:stretch>
+            <a:fillRect/>
+          </a:stretch>
+        </p:blipFill>
+        <p:spPr>
+          <a:xfrm>
+            <a:off x="258298" y="1653448"/>
+            <a:ext cx="7219802" cy="1584606"/>
+          </a:xfrm>
+          <a:prstGeom prst="rect">
+            <a:avLst/>
+          </a:prstGeom>
+        </p:spPr>
+      </p:pic>
+      <p:pic>
+        <p:nvPicPr>
+          <p:cNvPr id="4" name="Picture 3" descr="Screen Shot 2015-07-27 at 7.14.39 PM.png"/>
+          <p:cNvPicPr>
+            <a:picLocks noChangeAspect="1"/>
+          </p:cNvPicPr>
+          <p:nvPr/>
+        </p:nvPicPr>
+        <p:blipFill>
+          <a:blip r:embed="rId3">
+            <a:extLst>
+              <a:ext uri="{28A0092B-C50C-407E-A947-70E740481C1C}">
+                <a14:useLocalDpi xmlns:a14="http://schemas.microsoft.com/office/drawing/2010/main" val="0"/>
+              </a:ext>
+            </a:extLst>
+          </a:blip>
+          <a:stretch>
+            <a:fillRect/>
+          </a:stretch>
+        </p:blipFill>
+        <p:spPr>
+          <a:xfrm>
+            <a:off x="1474448" y="3076625"/>
+            <a:ext cx="7465065" cy="3363705"/>
+          </a:xfrm>
+          <a:prstGeom prst="rect">
+            <a:avLst/>
+          </a:prstGeom>
+          <a:ln>
+            <a:noFill/>
+          </a:ln>
+          <a:effectLst>
+            <a:outerShdw blurRad="292100" dist="139700" dir="2700000" algn="tl" rotWithShape="0">
+              <a:srgbClr val="333333">
+                <a:alpha val="65000"/>
+              </a:srgbClr>
+            </a:outerShdw>
+          </a:effectLst>
+        </p:spPr>
+      </p:pic>
+    </p:spTree>
+    <p:extLst>
+      <p:ext uri="{BB962C8B-B14F-4D97-AF65-F5344CB8AC3E}">
+        <p14:creationId xmlns:p14="http://schemas.microsoft.com/office/powerpoint/2010/main" val="2059610856"/>
+      </p:ext>
+    </p:extLst>
+  </p:cSld>
+  <p:clrMapOvr>
+    <a:masterClrMapping/>
+  </p:clrMapOvr>
+</p:sld>
+</file>
+
+<file path=ppt/slides/slide13.xml><?xml version="1.0" encoding="utf-8"?>
+<p:sld xmlns:a="http://schemas.openxmlformats.org/drawingml/2006/main" xmlns:r="http://schemas.openxmlformats.org/officeDocument/2006/relationships" xmlns:p="http://schemas.openxmlformats.org/presentationml/2006/main">
+  <p:cSld>
+    <p:spTree>
+      <p:nvGrpSpPr>
+        <p:cNvPr id="1" name=""/>
+        <p:cNvGrpSpPr/>
+        <p:nvPr/>
+      </p:nvGrpSpPr>
+      <p:grpSpPr>
+        <a:xfrm>
+          <a:off x="0" y="0"/>
+          <a:ext cx="0" cy="0"/>
+          <a:chOff x="0" y="0"/>
+          <a:chExt cx="0" cy="0"/>
+        </a:xfrm>
+      </p:grpSpPr>
+      <p:sp>
+        <p:nvSpPr>
+          <p:cNvPr id="2" name="Title 1"/>
+          <p:cNvSpPr>
+            <a:spLocks noGrp="1"/>
+          </p:cNvSpPr>
+          <p:nvPr>
+            <p:ph type="title"/>
+          </p:nvPr>
+        </p:nvSpPr>
+        <p:spPr/>
+        <p:txBody>
+          <a:bodyPr/>
+          <a:lstStyle/>
+          <a:p>
+            <a:r>
+              <a:rPr lang="en-US" dirty="0" smtClean="0"/>
+              <a:t>Shortest Path Analysis</a:t>
+            </a:r>
+            <a:endParaRPr lang="en-US" dirty="0"/>
+          </a:p>
+        </p:txBody>
+      </p:sp>
+      <p:pic>
+        <p:nvPicPr>
+          <p:cNvPr id="4" name="Picture 3" descr="Screen Shot 2015-07-27 at 7.17.11 PM.png"/>
+          <p:cNvPicPr>
+            <a:picLocks noChangeAspect="1"/>
+          </p:cNvPicPr>
+          <p:nvPr/>
+        </p:nvPicPr>
+        <p:blipFill>
+          <a:blip r:embed="rId2">
+            <a:clrChange>
+              <a:clrFrom>
+                <a:srgbClr val="F8FAFC"/>
+              </a:clrFrom>
+              <a:clrTo>
+                <a:srgbClr val="F8FAFC">
+                  <a:alpha val="0"/>
+                </a:srgbClr>
+              </a:clrTo>
+            </a:clrChange>
+            <a:extLst>
+              <a:ext uri="{28A0092B-C50C-407E-A947-70E740481C1C}">
+                <a14:useLocalDpi xmlns:a14="http://schemas.microsoft.com/office/drawing/2010/main" val="0"/>
+              </a:ext>
+            </a:extLst>
+          </a:blip>
+          <a:stretch>
+            <a:fillRect/>
+          </a:stretch>
+        </p:blipFill>
+        <p:spPr>
+          <a:xfrm>
+            <a:off x="925567" y="3082608"/>
+            <a:ext cx="7895562" cy="3481943"/>
+          </a:xfrm>
+          <a:prstGeom prst="rect">
+            <a:avLst/>
+          </a:prstGeom>
+        </p:spPr>
+      </p:pic>
+      <p:pic>
+        <p:nvPicPr>
+          <p:cNvPr id="5" name="Picture 4" descr="Screen Shot 2015-07-27 at 7.17.57 PM.png"/>
+          <p:cNvPicPr>
+            <a:picLocks noChangeAspect="1"/>
+          </p:cNvPicPr>
+          <p:nvPr/>
+        </p:nvPicPr>
+        <p:blipFill>
+          <a:blip r:embed="rId3">
+            <a:clrChange>
+              <a:clrFrom>
+                <a:srgbClr val="FFFFFF"/>
+              </a:clrFrom>
+              <a:clrTo>
+                <a:srgbClr val="FFFFFF">
+                  <a:alpha val="0"/>
+                </a:srgbClr>
+              </a:clrTo>
+            </a:clrChange>
+            <a:extLst>
+              <a:ext uri="{28A0092B-C50C-407E-A947-70E740481C1C}">
+                <a14:useLocalDpi xmlns:a14="http://schemas.microsoft.com/office/drawing/2010/main" val="0"/>
+              </a:ext>
+            </a:extLst>
+          </a:blip>
+          <a:stretch>
+            <a:fillRect/>
+          </a:stretch>
+        </p:blipFill>
+        <p:spPr>
+          <a:xfrm>
+            <a:off x="226010" y="1795614"/>
+            <a:ext cx="8460790" cy="1149354"/>
+          </a:xfrm>
+          <a:prstGeom prst="rect">
+            <a:avLst/>
+          </a:prstGeom>
+        </p:spPr>
+      </p:pic>
+    </p:spTree>
+    <p:extLst>
+      <p:ext uri="{BB962C8B-B14F-4D97-AF65-F5344CB8AC3E}">
+        <p14:creationId xmlns:p14="http://schemas.microsoft.com/office/powerpoint/2010/main" val="1460534153"/>
+      </p:ext>
+    </p:extLst>
+  </p:cSld>
+  <p:clrMapOvr>
+    <a:masterClrMapping/>
+  </p:clrMapOvr>
 </p:sld>
 </file>
 
@@ -3959,7 +4493,7 @@
   <p:timing>
     <p:tnLst>
       <p:par>
-        <p:cTn id="1" dur="indefinite" restart="never" nodeType="tmRoot"/>
+        <p:cTn xmlns:p14="http://schemas.microsoft.com/office/powerpoint/2010/main" id="1" dur="indefinite" restart="never" nodeType="tmRoot"/>
       </p:par>
     </p:tnLst>
   </p:timing>
@@ -4285,7 +4819,7 @@
   <p:timing>
     <p:tnLst>
       <p:par>
-        <p:cTn id="1" dur="indefinite" restart="never" nodeType="tmRoot"/>
+        <p:cTn xmlns:p14="http://schemas.microsoft.com/office/powerpoint/2010/main" id="1" dur="indefinite" restart="never" nodeType="tmRoot"/>
       </p:par>
     </p:tnLst>
   </p:timing>
@@ -4404,7 +4938,7 @@
   <p:timing>
     <p:tnLst>
       <p:par>
-        <p:cTn id="1" dur="indefinite" restart="never" nodeType="tmRoot"/>
+        <p:cTn xmlns:p14="http://schemas.microsoft.com/office/powerpoint/2010/main" id="1" dur="indefinite" restart="never" nodeType="tmRoot"/>
       </p:par>
     </p:tnLst>
   </p:timing>
@@ -4482,7 +5016,7 @@
           </a:prstGeom>
           <a:noFill/>
           <a:extLst>
-            <a:ext uri="{909E8E84-426E-40DD-AFC4-6F175D3DCCD1}">
+            <a:ext uri="{909E8E84-426E-40dd-AFC4-6F175D3DCCD1}">
               <a14:hiddenFill xmlns:a14="http://schemas.microsoft.com/office/drawing/2010/main">
                 <a:solidFill>
                   <a:srgbClr val="FFFFFF"/>
@@ -4661,7 +5195,7 @@
   <p:timing>
     <p:tnLst>
       <p:par>
-        <p:cTn id="1" dur="indefinite" restart="never" nodeType="tmRoot">
+        <p:cTn xmlns:p14="http://schemas.microsoft.com/office/powerpoint/2010/main" id="1" dur="indefinite" restart="never" nodeType="tmRoot">
           <p:childTnLst>
             <p:seq concurrent="1" nextAc="seek">
               <p:cTn id="2" dur="indefinite" nodeType="mainSeq">
@@ -5630,14 +6164,14 @@
             <a:noFill/>
           </a:ln>
           <a:extLst>
-            <a:ext uri="{909E8E84-426E-40DD-AFC4-6F175D3DCCD1}">
+            <a:ext uri="{909E8E84-426E-40dd-AFC4-6F175D3DCCD1}">
               <a14:hiddenFill xmlns:a14="http://schemas.microsoft.com/office/drawing/2010/main">
                 <a:solidFill>
                   <a:schemeClr val="accent1"/>
                 </a:solidFill>
               </a14:hiddenFill>
             </a:ext>
-            <a:ext uri="{91240B29-F687-4F45-9708-019B960494DF}">
+            <a:ext uri="{91240B29-F687-4f45-9708-019B960494DF}">
               <a14:hiddenLine xmlns:a14="http://schemas.microsoft.com/office/drawing/2010/main" w="9525">
                 <a:solidFill>
                   <a:schemeClr val="tx1"/>
@@ -5793,7 +6327,7 @@
   <p:timing>
     <p:tnLst>
       <p:par>
-        <p:cTn id="1" dur="indefinite" restart="never" nodeType="tmRoot"/>
+        <p:cTn xmlns:p14="http://schemas.microsoft.com/office/powerpoint/2010/main" id="1" dur="indefinite" restart="never" nodeType="tmRoot"/>
       </p:par>
     </p:tnLst>
   </p:timing>
@@ -5909,7 +6443,7 @@
   <p:timing>
     <p:tnLst>
       <p:par>
-        <p:cTn id="1" dur="indefinite" restart="never" nodeType="tmRoot"/>
+        <p:cTn xmlns:p14="http://schemas.microsoft.com/office/powerpoint/2010/main" id="1" dur="indefinite" restart="never" nodeType="tmRoot"/>
       </p:par>
     </p:tnLst>
   </p:timing>
@@ -5958,7 +6492,7 @@
       </p:sp>
       <p:pic>
         <p:nvPicPr>
-          <p:cNvPr id="3" name="Picture 2" descr="Screen Shot 2014-09-08 at 2.37.12 PM.png"/>
+          <p:cNvPr id="4" name="Picture 3" descr="Screen Shot 2015-07-27 at 6.47.26 PM.png"/>
           <p:cNvPicPr>
             <a:picLocks noChangeAspect="1"/>
           </p:cNvPicPr>
@@ -5966,6 +6500,16 @@
         </p:nvPicPr>
         <p:blipFill>
           <a:blip r:embed="rId2">
+            <a:clrChange>
+              <a:clrFrom>
+                <a:srgbClr val="F6F7FA"/>
+              </a:clrFrom>
+              <a:clrTo>
+                <a:srgbClr val="F6F7FA">
+                  <a:alpha val="0"/>
+                </a:srgbClr>
+              </a:clrTo>
+            </a:clrChange>
             <a:extLst>
               <a:ext uri="{28A0092B-C50C-407E-A947-70E740481C1C}">
                 <a14:useLocalDpi xmlns:a14="http://schemas.microsoft.com/office/drawing/2010/main" val="0"/>
@@ -5978,8 +6522,8 @@
         </p:blipFill>
         <p:spPr>
           <a:xfrm>
-            <a:off x="457200" y="2112930"/>
-            <a:ext cx="8229600" cy="4359464"/>
+            <a:off x="0" y="1619878"/>
+            <a:ext cx="9144000" cy="5025358"/>
           </a:xfrm>
           <a:prstGeom prst="rect">
             <a:avLst/>
@@ -5999,7 +6543,7 @@
   <p:timing>
     <p:tnLst>
       <p:par>
-        <p:cTn id="1" dur="indefinite" restart="never" nodeType="tmRoot"/>
+        <p:cTn xmlns:p14="http://schemas.microsoft.com/office/powerpoint/2010/main" id="1" dur="indefinite" restart="never" nodeType="tmRoot"/>
       </p:par>
     </p:tnLst>
   </p:timing>
@@ -6040,7 +6584,7 @@
           <a:p>
             <a:r>
               <a:rPr lang="en-US" dirty="0" smtClean="0"/>
-              <a:t>Strong versus Weak Ties</a:t>
+              <a:t>Data Model</a:t>
             </a:r>
             <a:endParaRPr lang="en-US" dirty="0"/>
           </a:p>
@@ -6048,7 +6592,7 @@
       </p:sp>
       <p:pic>
         <p:nvPicPr>
-          <p:cNvPr id="3" name="Picture 2" descr="Screen Shot 2014-09-08 at 2.48.07 PM.png"/>
+          <p:cNvPr id="3" name="Picture 2" descr="Screen Shot 2015-07-27 at 6.42.17 PM.png"/>
           <p:cNvPicPr>
             <a:picLocks noChangeAspect="1"/>
           </p:cNvPicPr>
@@ -6056,6 +6600,16 @@
         </p:nvPicPr>
         <p:blipFill>
           <a:blip r:embed="rId2">
+            <a:clrChange>
+              <a:clrFrom>
+                <a:srgbClr val="F8FAFC"/>
+              </a:clrFrom>
+              <a:clrTo>
+                <a:srgbClr val="F8FAFC">
+                  <a:alpha val="0"/>
+                </a:srgbClr>
+              </a:clrTo>
+            </a:clrChange>
             <a:extLst>
               <a:ext uri="{28A0092B-C50C-407E-A947-70E740481C1C}">
                 <a14:useLocalDpi xmlns:a14="http://schemas.microsoft.com/office/drawing/2010/main" val="0"/>
@@ -6068,8 +6622,48 @@
         </p:blipFill>
         <p:spPr>
           <a:xfrm>
-            <a:off x="558800" y="1989118"/>
-            <a:ext cx="8128000" cy="4327896"/>
+            <a:off x="0" y="2049338"/>
+            <a:ext cx="9144000" cy="4123390"/>
+          </a:xfrm>
+          <a:prstGeom prst="rect">
+            <a:avLst/>
+          </a:prstGeom>
+        </p:spPr>
+      </p:pic>
+      <p:pic>
+        <p:nvPicPr>
+          <p:cNvPr id="6" name="Picture 5" descr="Screen Shot 2015-07-27 at 6.50.11 PM.png"/>
+          <p:cNvPicPr>
+            <a:picLocks noChangeAspect="1"/>
+          </p:cNvPicPr>
+          <p:nvPr/>
+        </p:nvPicPr>
+        <p:blipFill>
+          <a:blip r:embed="rId3">
+            <a:clrChange>
+              <a:clrFrom>
+                <a:srgbClr val="EAEFF6"/>
+              </a:clrFrom>
+              <a:clrTo>
+                <a:srgbClr val="EAEFF6">
+                  <a:alpha val="0"/>
+                </a:srgbClr>
+              </a:clrTo>
+            </a:clrChange>
+            <a:extLst>
+              <a:ext uri="{28A0092B-C50C-407E-A947-70E740481C1C}">
+                <a14:useLocalDpi xmlns:a14="http://schemas.microsoft.com/office/drawing/2010/main" val="0"/>
+              </a:ext>
+            </a:extLst>
+          </a:blip>
+          <a:stretch>
+            <a:fillRect/>
+          </a:stretch>
+        </p:blipFill>
+        <p:spPr>
+          <a:xfrm>
+            <a:off x="279822" y="1919362"/>
+            <a:ext cx="3467100" cy="444500"/>
           </a:xfrm>
           <a:prstGeom prst="rect">
             <a:avLst/>
@@ -6079,20 +6673,13 @@
     </p:spTree>
     <p:extLst>
       <p:ext uri="{BB962C8B-B14F-4D97-AF65-F5344CB8AC3E}">
-        <p14:creationId xmlns:p14="http://schemas.microsoft.com/office/powerpoint/2010/main" val="510905826"/>
+        <p14:creationId xmlns:p14="http://schemas.microsoft.com/office/powerpoint/2010/main" val="2144104183"/>
       </p:ext>
     </p:extLst>
   </p:cSld>
   <p:clrMapOvr>
     <a:masterClrMapping/>
   </p:clrMapOvr>
-  <p:timing>
-    <p:tnLst>
-      <p:par>
-        <p:cTn id="1" dur="indefinite" restart="never" nodeType="tmRoot"/>
-      </p:par>
-    </p:tnLst>
-  </p:timing>
 </p:sld>
 </file>
 

</xml_diff>